<commit_message>
update learning objectives based on UCPE feedback.
</commit_message>
<xml_diff>
--- a/module-2/ppt/2.0-introduction.pptx
+++ b/module-2/ppt/2.0-introduction.pptx
@@ -212,7 +212,7 @@
           <a:p>
             <a:fld id="{A2472FB4-D3E2-AE43-B634-FEEAFFC420FD}" type="datetimeFigureOut">
               <a:rPr lang="en-US" smtClean="0"/>
-              <a:t>10/19/20</a:t>
+              <a:t>11/16/20</a:t>
             </a:fld>
             <a:endParaRPr lang="en-US"/>
           </a:p>
@@ -4263,24 +4263,6 @@
       </p:grpSpPr>
       <p:sp>
         <p:nvSpPr>
-          <p:cNvPr id="2" name="Picture Placeholder 1">
-            <a:extLst>
-              <a:ext uri="{FF2B5EF4-FFF2-40B4-BE49-F238E27FC236}">
-                <a16:creationId xmlns:a16="http://schemas.microsoft.com/office/drawing/2014/main" id="{213C6985-EE72-0A43-AAEA-6945E231951C}"/>
-              </a:ext>
-            </a:extLst>
-          </p:cNvPr>
-          <p:cNvSpPr>
-            <a:spLocks noGrp="1"/>
-          </p:cNvSpPr>
-          <p:nvPr>
-            <p:ph type="pic" sz="quarter" idx="13"/>
-          </p:nvPr>
-        </p:nvSpPr>
-        <p:spPr/>
-      </p:sp>
-      <p:sp>
-        <p:nvSpPr>
           <p:cNvPr id="3" name="Title 2">
             <a:extLst>
               <a:ext uri="{FF2B5EF4-FFF2-40B4-BE49-F238E27FC236}">
@@ -4332,34 +4314,25 @@
           <a:p>
             <a:r>
               <a:rPr lang="en-US" dirty="0"/>
-              <a:t>Internet basics</a:t>
-            </a:r>
-          </a:p>
-          <a:p>
-            <a:endParaRPr lang="en-US" dirty="0"/>
+              <a:t>Describe the basic architecture of the internet and the mechanics of networked communications </a:t>
+            </a:r>
           </a:p>
           <a:p>
             <a:r>
               <a:rPr lang="en-US" dirty="0"/>
-              <a:t>Data acquisition</a:t>
-            </a:r>
-          </a:p>
-          <a:p>
-            <a:endParaRPr lang="en-US" dirty="0"/>
+              <a:t>Acquire and represent data for modeling and analysis</a:t>
+            </a:r>
           </a:p>
           <a:p>
             <a:r>
               <a:rPr lang="en-US" dirty="0"/>
-              <a:t>Application of (simple) models</a:t>
-            </a:r>
-          </a:p>
-          <a:p>
-            <a:endParaRPr lang="en-US" dirty="0"/>
-          </a:p>
-          <a:p>
-            <a:r>
-              <a:rPr lang="en-US" dirty="0"/>
-              <a:t>More complex applications</a:t>
+              <a:t>Implement simple supervised machine-learning models for cybersecurity applications</a:t>
+            </a:r>
+          </a:p>
+          <a:p>
+            <a:r>
+              <a:rPr lang="en-US"/>
+              <a:t>Analyze network traffic using unsupervised learning techniques, such as PCA and clustering</a:t>
             </a:r>
           </a:p>
         </p:txBody>

</xml_diff>

<commit_message>
first stab on module 3 material
</commit_message>
<xml_diff>
--- a/module-2/ppt/2.0-introduction.pptx
+++ b/module-2/ppt/2.0-introduction.pptx
@@ -4314,7 +4314,15 @@
           <a:p>
             <a:r>
               <a:rPr lang="en-US" dirty="0"/>
-              <a:t>Describe the basic architecture of the internet and the mechanics of networked communications </a:t>
+              <a:t>Describe the basic architecture of </a:t>
+            </a:r>
+            <a:r>
+              <a:rPr lang="en-US"/>
+              <a:t>the Internet </a:t>
+            </a:r>
+            <a:r>
+              <a:rPr lang="en-US" dirty="0"/>
+              <a:t>and the mechanics of networked communications </a:t>
             </a:r>
           </a:p>
           <a:p>
@@ -4331,7 +4339,7 @@
           </a:p>
           <a:p>
             <a:r>
-              <a:rPr lang="en-US"/>
+              <a:rPr lang="en-US" dirty="0"/>
               <a:t>Analyze network traffic using unsupervised learning techniques, such as PCA and clustering</a:t>
             </a:r>
           </a:p>

</xml_diff>

<commit_message>
live session slides, reordering
</commit_message>
<xml_diff>
--- a/module-2/ppt/2.0-introduction.pptx
+++ b/module-2/ppt/2.0-introduction.pptx
@@ -3560,6 +3560,104 @@
           <a:chExt cx="0" cy="0"/>
         </a:xfrm>
       </p:grpSpPr>
+      <p:sp>
+        <p:nvSpPr>
+          <p:cNvPr id="43" name="Rectangle 42">
+            <a:extLst>
+              <a:ext uri="{FF2B5EF4-FFF2-40B4-BE49-F238E27FC236}">
+                <a16:creationId xmlns:a16="http://schemas.microsoft.com/office/drawing/2014/main" id="{5D175768-E063-DC40-B400-7D1D6BCDD38A}"/>
+              </a:ext>
+            </a:extLst>
+          </p:cNvPr>
+          <p:cNvSpPr/>
+          <p:nvPr/>
+        </p:nvSpPr>
+        <p:spPr>
+          <a:xfrm>
+            <a:off x="1757067" y="32953"/>
+            <a:ext cx="3609832" cy="2214496"/>
+          </a:xfrm>
+          <a:prstGeom prst="rect">
+            <a:avLst/>
+          </a:prstGeom>
+          <a:ln w="63500">
+            <a:solidFill>
+              <a:srgbClr val="7F0000"/>
+            </a:solidFill>
+          </a:ln>
+        </p:spPr>
+        <p:style>
+          <a:lnRef idx="2">
+            <a:schemeClr val="accent6"/>
+          </a:lnRef>
+          <a:fillRef idx="1">
+            <a:schemeClr val="lt1"/>
+          </a:fillRef>
+          <a:effectRef idx="0">
+            <a:schemeClr val="accent6"/>
+          </a:effectRef>
+          <a:fontRef idx="minor">
+            <a:schemeClr val="dk1"/>
+          </a:fontRef>
+        </p:style>
+        <p:txBody>
+          <a:bodyPr rtlCol="0" anchor="ctr"/>
+          <a:lstStyle/>
+          <a:p>
+            <a:pPr algn="ctr"/>
+            <a:endParaRPr lang="en-US"/>
+          </a:p>
+        </p:txBody>
+      </p:sp>
+      <p:sp>
+        <p:nvSpPr>
+          <p:cNvPr id="41" name="Rectangle 40">
+            <a:extLst>
+              <a:ext uri="{FF2B5EF4-FFF2-40B4-BE49-F238E27FC236}">
+                <a16:creationId xmlns:a16="http://schemas.microsoft.com/office/drawing/2014/main" id="{9CE44CC2-20ED-5844-9797-147A037AF608}"/>
+              </a:ext>
+            </a:extLst>
+          </p:cNvPr>
+          <p:cNvSpPr/>
+          <p:nvPr/>
+        </p:nvSpPr>
+        <p:spPr>
+          <a:xfrm>
+            <a:off x="125194" y="2332674"/>
+            <a:ext cx="5892547" cy="2615289"/>
+          </a:xfrm>
+          <a:prstGeom prst="rect">
+            <a:avLst/>
+          </a:prstGeom>
+          <a:ln w="63500">
+            <a:solidFill>
+              <a:srgbClr val="7F0000"/>
+            </a:solidFill>
+          </a:ln>
+        </p:spPr>
+        <p:style>
+          <a:lnRef idx="2">
+            <a:schemeClr val="accent6"/>
+          </a:lnRef>
+          <a:fillRef idx="1">
+            <a:schemeClr val="lt1"/>
+          </a:fillRef>
+          <a:effectRef idx="0">
+            <a:schemeClr val="accent6"/>
+          </a:effectRef>
+          <a:fontRef idx="minor">
+            <a:schemeClr val="dk1"/>
+          </a:fontRef>
+        </p:style>
+        <p:txBody>
+          <a:bodyPr rtlCol="0" anchor="ctr"/>
+          <a:lstStyle/>
+          <a:p>
+            <a:pPr algn="ctr"/>
+            <a:endParaRPr lang="en-US"/>
+          </a:p>
+        </p:txBody>
+      </p:sp>
       <p:grpSp>
         <p:nvGrpSpPr>
           <p:cNvPr id="28" name="Group 27">
@@ -5185,7 +5283,7 @@
         </p:nvSpPr>
         <p:spPr>
           <a:xfrm>
-            <a:off x="2368853" y="2305192"/>
+            <a:off x="2368853" y="2379334"/>
             <a:ext cx="1133644" cy="369332"/>
           </a:xfrm>
           <a:prstGeom prst="rect">

</xml_diff>